<commit_message>
pdf slides for day 1
</commit_message>
<xml_diff>
--- a/day1/slides/git.pptx
+++ b/day1/slides/git.pptx
@@ -5,27 +5,29 @@
     <p:sldMasterId id="2147483648" r:id="rId1"/>
   </p:sldMasterIdLst>
   <p:notesMasterIdLst>
-    <p:notesMasterId r:id="rId20"/>
+    <p:notesMasterId r:id="rId22"/>
   </p:notesMasterIdLst>
   <p:sldIdLst>
     <p:sldId id="256" r:id="rId2"/>
-    <p:sldId id="475" r:id="rId3"/>
-    <p:sldId id="566" r:id="rId4"/>
-    <p:sldId id="567" r:id="rId5"/>
-    <p:sldId id="575" r:id="rId6"/>
-    <p:sldId id="572" r:id="rId7"/>
-    <p:sldId id="573" r:id="rId8"/>
-    <p:sldId id="569" r:id="rId9"/>
-    <p:sldId id="574" r:id="rId10"/>
-    <p:sldId id="570" r:id="rId11"/>
-    <p:sldId id="577" r:id="rId12"/>
-    <p:sldId id="576" r:id="rId13"/>
-    <p:sldId id="578" r:id="rId14"/>
-    <p:sldId id="579" r:id="rId15"/>
-    <p:sldId id="580" r:id="rId16"/>
-    <p:sldId id="571" r:id="rId17"/>
-    <p:sldId id="583" r:id="rId18"/>
-    <p:sldId id="582" r:id="rId19"/>
+    <p:sldId id="584" r:id="rId3"/>
+    <p:sldId id="585" r:id="rId4"/>
+    <p:sldId id="475" r:id="rId5"/>
+    <p:sldId id="566" r:id="rId6"/>
+    <p:sldId id="567" r:id="rId7"/>
+    <p:sldId id="575" r:id="rId8"/>
+    <p:sldId id="572" r:id="rId9"/>
+    <p:sldId id="573" r:id="rId10"/>
+    <p:sldId id="569" r:id="rId11"/>
+    <p:sldId id="574" r:id="rId12"/>
+    <p:sldId id="570" r:id="rId13"/>
+    <p:sldId id="577" r:id="rId14"/>
+    <p:sldId id="576" r:id="rId15"/>
+    <p:sldId id="578" r:id="rId16"/>
+    <p:sldId id="579" r:id="rId17"/>
+    <p:sldId id="580" r:id="rId18"/>
+    <p:sldId id="571" r:id="rId19"/>
+    <p:sldId id="583" r:id="rId20"/>
+    <p:sldId id="582" r:id="rId21"/>
   </p:sldIdLst>
   <p:sldSz cx="9144000" cy="6858000" type="screen4x3"/>
   <p:notesSz cx="6858000" cy="9144000"/>
@@ -4595,10 +4597,10 @@
       </p:grpSpPr>
       <p:sp>
         <p:nvSpPr>
-          <p:cNvPr id="20481" name="Title 1">
-            <a:extLst>
-              <a:ext uri="{FF2B5EF4-FFF2-40B4-BE49-F238E27FC236}">
-                <a16:creationId xmlns:a16="http://schemas.microsoft.com/office/drawing/2014/main" id="{95AB5E63-389A-E546-9CCF-4CEDCF58CD3B}"/>
+          <p:cNvPr id="19457" name="Title 1">
+            <a:extLst>
+              <a:ext uri="{FF2B5EF4-FFF2-40B4-BE49-F238E27FC236}">
+                <a16:creationId xmlns:a16="http://schemas.microsoft.com/office/drawing/2014/main" id="{A47132AC-57AB-434E-A0AA-5BF63B521B5A}"/>
               </a:ext>
             </a:extLst>
           </p:cNvPr>
@@ -4616,17 +4618,17 @@
           <a:p>
             <a:r>
               <a:rPr lang="en-US" altLang="en-US"/>
-              <a:t>Exercises (follow tutorial)</a:t>
-            </a:r>
-          </a:p>
-        </p:txBody>
-      </p:sp>
-      <p:sp>
-        <p:nvSpPr>
-          <p:cNvPr id="21506" name="Content Placeholder 2">
-            <a:extLst>
-              <a:ext uri="{FF2B5EF4-FFF2-40B4-BE49-F238E27FC236}">
-                <a16:creationId xmlns:a16="http://schemas.microsoft.com/office/drawing/2014/main" id="{4603C7EF-87C1-A244-92A5-DFCC26EFB313}"/>
+              <a:t>Version control with Git</a:t>
+            </a:r>
+          </a:p>
+        </p:txBody>
+      </p:sp>
+      <p:sp>
+        <p:nvSpPr>
+          <p:cNvPr id="19458" name="Content Placeholder 2">
+            <a:extLst>
+              <a:ext uri="{FF2B5EF4-FFF2-40B4-BE49-F238E27FC236}">
+                <a16:creationId xmlns:a16="http://schemas.microsoft.com/office/drawing/2014/main" id="{036B98B5-28F7-294A-B980-025B325F3014}"/>
               </a:ext>
             </a:extLst>
           </p:cNvPr>
@@ -4637,110 +4639,72 @@
             <p:ph idx="1"/>
           </p:nvPr>
         </p:nvSpPr>
-        <p:spPr>
-          <a:xfrm>
-            <a:off x="457200" y="1406525"/>
-            <a:ext cx="8229600" cy="4525963"/>
-          </a:xfrm>
-        </p:spPr>
+        <p:spPr/>
         <p:txBody>
           <a:bodyPr/>
           <a:lstStyle/>
           <a:p>
-            <a:pPr marL="514350" indent="-514350">
-              <a:buFontTx/>
-              <a:buAutoNum type="arabicPeriod"/>
-            </a:pPr>
             <a:r>
               <a:rPr lang="en-US" altLang="en-US"/>
-              <a:t>Install Git</a:t>
-            </a:r>
-          </a:p>
-          <a:p>
-            <a:pPr marL="914400" lvl="1" indent="-514350"/>
+              <a:t>Why use Git?</a:t>
+            </a:r>
+          </a:p>
+          <a:p>
+            <a:pPr lvl="1"/>
             <a:r>
               <a:rPr lang="en-US" altLang="en-US">
                 <a:ea typeface="Arial" panose="020B0604020202020204" pitchFamily="34" charset="0"/>
               </a:rPr>
-              <a:t>Mac:  install Xcode command line tools from the App Store</a:t>
-            </a:r>
-          </a:p>
-          <a:p>
-            <a:pPr marL="914400" lvl="1" indent="-514350"/>
+              <a:t>keep a record of what you were doing and  thinking during the lifecycle of a project</a:t>
+            </a:r>
+          </a:p>
+          <a:p>
+            <a:pPr lvl="1"/>
             <a:r>
               <a:rPr lang="en-US" altLang="en-US">
                 <a:ea typeface="Arial" panose="020B0604020202020204" pitchFamily="34" charset="0"/>
               </a:rPr>
-              <a:t>Windows: </a:t>
-            </a:r>
-            <a:r>
-              <a:rPr lang="en-AU" altLang="en-US">
-                <a:ea typeface="Arial" panose="020B0604020202020204" pitchFamily="34" charset="0"/>
-                <a:hlinkClick r:id="rId2"/>
-              </a:rPr>
-              <a:t>https://gitforwindows.org/</a:t>
-            </a:r>
-            <a:br>
-              <a:rPr lang="en-AU" altLang="en-US">
+              <a:t>“version control is like an undo command for </a:t>
+            </a:r>
+            <a:r>
+              <a:rPr lang="en-US" altLang="en-US" i="1">
                 <a:ea typeface="Arial" panose="020B0604020202020204" pitchFamily="34" charset="0"/>
               </a:rPr>
-            </a:br>
-            <a:endParaRPr lang="en-US" altLang="en-US">
-              <a:ea typeface="Arial" panose="020B0604020202020204" pitchFamily="34" charset="0"/>
-            </a:endParaRPr>
-          </a:p>
-          <a:p>
-            <a:pPr marL="514350" indent="-514350">
-              <a:buFontTx/>
-              <a:buAutoNum type="arabicPeriod"/>
-            </a:pPr>
-            <a:r>
-              <a:rPr lang="en-US" altLang="en-US"/>
-              <a:t>Check Git is installed</a:t>
-            </a:r>
-          </a:p>
-          <a:p>
-            <a:pPr marL="514350" indent="-514350">
-              <a:buFontTx/>
-              <a:buAutoNum type="arabicPeriod"/>
-            </a:pPr>
-            <a:r>
-              <a:rPr lang="en-US" altLang="en-US"/>
-              <a:t>Set user.name and user.email</a:t>
-            </a:r>
-          </a:p>
-          <a:p>
-            <a:pPr marL="514350" indent="-514350">
-              <a:buFontTx/>
-              <a:buNone/>
-            </a:pPr>
-            <a:endParaRPr lang="en-US" altLang="en-US"/>
-          </a:p>
-          <a:p>
-            <a:pPr marL="514350" indent="-514350">
-              <a:buFontTx/>
-              <a:buNone/>
-            </a:pPr>
-            <a:endParaRPr lang="en-AU" altLang="en-US"/>
-          </a:p>
-          <a:p>
-            <a:pPr marL="914400" lvl="1" indent="-514350">
-              <a:buFontTx/>
-              <a:buNone/>
-            </a:pPr>
-            <a:endParaRPr lang="en-US" altLang="en-US">
-              <a:ea typeface="Arial" panose="020B0604020202020204" pitchFamily="34" charset="0"/>
-            </a:endParaRPr>
-          </a:p>
-          <a:p>
-            <a:pPr marL="514350" indent="-514350"/>
-            <a:endParaRPr lang="en-US" altLang="en-US"/>
-          </a:p>
-          <a:p>
-            <a:pPr marL="914400" lvl="1" indent="-514350"/>
-            <a:endParaRPr lang="en-US" altLang="en-US">
-              <a:ea typeface="Arial" panose="020B0604020202020204" pitchFamily="34" charset="0"/>
-            </a:endParaRPr>
+              <a:t>everything</a:t>
+            </a:r>
+            <a:r>
+              <a:rPr lang="en-US" altLang="en-US">
+                <a:ea typeface="Arial" panose="020B0604020202020204" pitchFamily="34" charset="0"/>
+              </a:rPr>
+              <a:t>” </a:t>
+            </a:r>
+          </a:p>
+          <a:p>
+            <a:pPr lvl="1"/>
+            <a:r>
+              <a:rPr lang="en-US" altLang="en-US">
+                <a:ea typeface="Arial" panose="020B0604020202020204" pitchFamily="34" charset="0"/>
+              </a:rPr>
+              <a:t>have a backup if your laptop dies or is stolen </a:t>
+            </a:r>
+          </a:p>
+          <a:p>
+            <a:pPr lvl="1"/>
+            <a:r>
+              <a:rPr lang="en-US" altLang="en-US">
+                <a:ea typeface="Arial" panose="020B0604020202020204" pitchFamily="34" charset="0"/>
+              </a:rPr>
+              <a:t>collaborate on code and writing (optional)</a:t>
+            </a:r>
+          </a:p>
+          <a:p>
+            <a:pPr lvl="1"/>
+            <a:r>
+              <a:rPr lang="en-US" altLang="en-US">
+                <a:ea typeface="Arial" panose="020B0604020202020204" pitchFamily="34" charset="0"/>
+              </a:rPr>
+              <a:t>release code and data publicly (optional)</a:t>
+            </a:r>
           </a:p>
         </p:txBody>
       </p:sp>
@@ -4769,131 +4733,66 @@
           <a:chExt cx="0" cy="0"/>
         </a:xfrm>
       </p:grpSpPr>
-      <p:sp>
-        <p:nvSpPr>
-          <p:cNvPr id="21505" name="Title 1">
-            <a:extLst>
-              <a:ext uri="{FF2B5EF4-FFF2-40B4-BE49-F238E27FC236}">
-                <a16:creationId xmlns:a16="http://schemas.microsoft.com/office/drawing/2014/main" id="{0F3DF877-032C-C242-872D-29507D0CE823}"/>
-              </a:ext>
-            </a:extLst>
-          </p:cNvPr>
-          <p:cNvSpPr>
-            <a:spLocks noGrp="1" noChangeArrowheads="1"/>
-          </p:cNvSpPr>
-          <p:nvPr>
-            <p:ph type="title"/>
-          </p:nvPr>
-        </p:nvSpPr>
-        <p:spPr/>
-        <p:txBody>
-          <a:bodyPr/>
-          <a:lstStyle/>
-          <a:p>
-            <a:r>
-              <a:rPr lang="en-US" altLang="en-US"/>
-              <a:t>GitHub</a:t>
-            </a:r>
-          </a:p>
-        </p:txBody>
-      </p:sp>
-      <p:sp>
-        <p:nvSpPr>
-          <p:cNvPr id="21506" name="Content Placeholder 2">
-            <a:extLst>
-              <a:ext uri="{FF2B5EF4-FFF2-40B4-BE49-F238E27FC236}">
-                <a16:creationId xmlns:a16="http://schemas.microsoft.com/office/drawing/2014/main" id="{D1D510FA-5BED-A249-A506-7BDE5C6EE021}"/>
-              </a:ext>
-            </a:extLst>
-          </p:cNvPr>
-          <p:cNvSpPr>
-            <a:spLocks noGrp="1" noChangeArrowheads="1"/>
-          </p:cNvSpPr>
-          <p:nvPr>
-            <p:ph idx="1"/>
-          </p:nvPr>
-        </p:nvSpPr>
-        <p:spPr>
+      <p:pic>
+        <p:nvPicPr>
+          <p:cNvPr id="29697" name="Picture 3">
+            <a:extLst>
+              <a:ext uri="{FF2B5EF4-FFF2-40B4-BE49-F238E27FC236}">
+                <a16:creationId xmlns:a16="http://schemas.microsoft.com/office/drawing/2014/main" id="{F1DEDE6A-376F-1F44-A78E-46FD9CBC099E}"/>
+              </a:ext>
+            </a:extLst>
+          </p:cNvPr>
+          <p:cNvPicPr>
+            <a:picLocks noChangeAspect="1" noChangeArrowheads="1"/>
+          </p:cNvPicPr>
+          <p:nvPr/>
+        </p:nvPicPr>
+        <p:blipFill>
+          <a:blip r:embed="rId2">
+            <a:extLst>
+              <a:ext uri="{28A0092B-C50C-407E-A947-70E740481C1C}">
+                <a14:useLocalDpi xmlns:a14="http://schemas.microsoft.com/office/drawing/2010/main" val="0"/>
+              </a:ext>
+            </a:extLst>
+          </a:blip>
+          <a:srcRect/>
+          <a:stretch>
+            <a:fillRect/>
+          </a:stretch>
+        </p:blipFill>
+        <p:spPr bwMode="auto">
           <a:xfrm>
-            <a:off x="457200" y="1570038"/>
-            <a:ext cx="8229600" cy="4525962"/>
+            <a:off x="2686050" y="698500"/>
+            <a:ext cx="3771900" cy="5461000"/>
           </a:xfrm>
-        </p:spPr>
-        <p:txBody>
-          <a:bodyPr/>
-          <a:lstStyle/>
-          <a:p>
-            <a:pPr marL="0" indent="0">
-              <a:buFontTx/>
-              <a:buNone/>
-            </a:pPr>
-            <a:r>
-              <a:rPr lang="en-AU" altLang="en-US"/>
-              <a:t>GitHub (and other similar sites) allows you to host repositories remotely.</a:t>
-            </a:r>
-          </a:p>
-          <a:p>
-            <a:pPr marL="0" indent="0">
-              <a:buFontTx/>
-              <a:buNone/>
-            </a:pPr>
-            <a:br>
-              <a:rPr lang="en-AU" altLang="en-US"/>
-            </a:br>
-            <a:endParaRPr lang="en-AU" altLang="en-US"/>
-          </a:p>
-          <a:p>
-            <a:pPr marL="0" indent="0">
-              <a:buFontTx/>
-              <a:buNone/>
-            </a:pPr>
-            <a:r>
-              <a:rPr lang="en-US" altLang="en-US" sz="4000"/>
-              <a:t>Exercise: </a:t>
-            </a:r>
-          </a:p>
-          <a:p>
-            <a:pPr marL="0" indent="0"/>
-            <a:r>
-              <a:rPr lang="en-US" altLang="en-US"/>
-              <a:t>Sign up for a GitHub account. Use a university email if possible, and choose your username wisely!</a:t>
-            </a:r>
-          </a:p>
-          <a:p>
-            <a:pPr marL="0" indent="0">
-              <a:buFontTx/>
-              <a:buAutoNum type="arabicPeriod"/>
-            </a:pPr>
-            <a:endParaRPr lang="en-US" altLang="en-US"/>
-          </a:p>
-          <a:p>
-            <a:pPr marL="0" indent="0">
-              <a:buFontTx/>
-              <a:buNone/>
-            </a:pPr>
-            <a:endParaRPr lang="en-AU" altLang="en-US"/>
-          </a:p>
-          <a:p>
-            <a:pPr marL="457200" lvl="1" indent="0">
-              <a:buFontTx/>
-              <a:buNone/>
-            </a:pPr>
-            <a:endParaRPr lang="en-US" altLang="en-US">
-              <a:ea typeface="Arial" panose="020B0604020202020204" pitchFamily="34" charset="0"/>
-            </a:endParaRPr>
-          </a:p>
-          <a:p>
-            <a:pPr marL="0" indent="0"/>
-            <a:endParaRPr lang="en-US" altLang="en-US"/>
-          </a:p>
-          <a:p>
-            <a:pPr marL="457200" lvl="1" indent="0"/>
-            <a:endParaRPr lang="en-US" altLang="en-US">
-              <a:ea typeface="Arial" panose="020B0604020202020204" pitchFamily="34" charset="0"/>
-            </a:endParaRPr>
-          </a:p>
-        </p:txBody>
-      </p:sp>
+          <a:prstGeom prst="rect">
+            <a:avLst/>
+          </a:prstGeom>
+          <a:noFill/>
+          <a:ln>
+            <a:noFill/>
+          </a:ln>
+          <a:extLst>
+            <a:ext uri="{909E8E84-426E-40DD-AFC4-6F175D3DCCD1}">
+              <a14:hiddenFill xmlns:a14="http://schemas.microsoft.com/office/drawing/2010/main">
+                <a:solidFill>
+                  <a:srgbClr val="FFFFFF"/>
+                </a:solidFill>
+              </a14:hiddenFill>
+            </a:ext>
+            <a:ext uri="{91240B29-F687-4F45-9708-019B960494DF}">
+              <a14:hiddenLine xmlns:a14="http://schemas.microsoft.com/office/drawing/2010/main" w="9525">
+                <a:solidFill>
+                  <a:srgbClr val="000000"/>
+                </a:solidFill>
+                <a:miter lim="800000"/>
+                <a:headEnd/>
+                <a:tailEnd/>
+              </a14:hiddenLine>
+            </a:ext>
+          </a:extLst>
+        </p:spPr>
+      </p:pic>
     </p:spTree>
   </p:cSld>
   <p:clrMapOvr>
@@ -4903,6 +4802,332 @@
 </file>
 
 <file path=ppt/slides/slide12.xml><?xml version="1.0" encoding="utf-8"?>
+<p:sld xmlns:a="http://schemas.openxmlformats.org/drawingml/2006/main" xmlns:r="http://schemas.openxmlformats.org/officeDocument/2006/relationships" xmlns:p="http://schemas.openxmlformats.org/presentationml/2006/main">
+  <p:cSld>
+    <p:spTree>
+      <p:nvGrpSpPr>
+        <p:cNvPr id="1" name=""/>
+        <p:cNvGrpSpPr/>
+        <p:nvPr/>
+      </p:nvGrpSpPr>
+      <p:grpSpPr>
+        <a:xfrm>
+          <a:off x="0" y="0"/>
+          <a:ext cx="0" cy="0"/>
+          <a:chOff x="0" y="0"/>
+          <a:chExt cx="0" cy="0"/>
+        </a:xfrm>
+      </p:grpSpPr>
+      <p:sp>
+        <p:nvSpPr>
+          <p:cNvPr id="20481" name="Title 1">
+            <a:extLst>
+              <a:ext uri="{FF2B5EF4-FFF2-40B4-BE49-F238E27FC236}">
+                <a16:creationId xmlns:a16="http://schemas.microsoft.com/office/drawing/2014/main" id="{95AB5E63-389A-E546-9CCF-4CEDCF58CD3B}"/>
+              </a:ext>
+            </a:extLst>
+          </p:cNvPr>
+          <p:cNvSpPr>
+            <a:spLocks noGrp="1" noChangeArrowheads="1"/>
+          </p:cNvSpPr>
+          <p:nvPr>
+            <p:ph type="title"/>
+          </p:nvPr>
+        </p:nvSpPr>
+        <p:spPr/>
+        <p:txBody>
+          <a:bodyPr/>
+          <a:lstStyle/>
+          <a:p>
+            <a:r>
+              <a:rPr lang="en-US" altLang="en-US"/>
+              <a:t>Exercises (follow tutorial)</a:t>
+            </a:r>
+          </a:p>
+        </p:txBody>
+      </p:sp>
+      <p:sp>
+        <p:nvSpPr>
+          <p:cNvPr id="21506" name="Content Placeholder 2">
+            <a:extLst>
+              <a:ext uri="{FF2B5EF4-FFF2-40B4-BE49-F238E27FC236}">
+                <a16:creationId xmlns:a16="http://schemas.microsoft.com/office/drawing/2014/main" id="{4603C7EF-87C1-A244-92A5-DFCC26EFB313}"/>
+              </a:ext>
+            </a:extLst>
+          </p:cNvPr>
+          <p:cNvSpPr>
+            <a:spLocks noGrp="1" noChangeArrowheads="1"/>
+          </p:cNvSpPr>
+          <p:nvPr>
+            <p:ph idx="1"/>
+          </p:nvPr>
+        </p:nvSpPr>
+        <p:spPr>
+          <a:xfrm>
+            <a:off x="457200" y="1406525"/>
+            <a:ext cx="8229600" cy="4525963"/>
+          </a:xfrm>
+        </p:spPr>
+        <p:txBody>
+          <a:bodyPr/>
+          <a:lstStyle/>
+          <a:p>
+            <a:pPr marL="514350" indent="-514350">
+              <a:buFontTx/>
+              <a:buAutoNum type="arabicPeriod"/>
+            </a:pPr>
+            <a:r>
+              <a:rPr lang="en-US" altLang="en-US"/>
+              <a:t>Install Git</a:t>
+            </a:r>
+          </a:p>
+          <a:p>
+            <a:pPr marL="914400" lvl="1" indent="-514350"/>
+            <a:r>
+              <a:rPr lang="en-US" altLang="en-US">
+                <a:ea typeface="Arial" panose="020B0604020202020204" pitchFamily="34" charset="0"/>
+              </a:rPr>
+              <a:t>Mac:  install Xcode command line tools from the App Store</a:t>
+            </a:r>
+          </a:p>
+          <a:p>
+            <a:pPr marL="914400" lvl="1" indent="-514350"/>
+            <a:r>
+              <a:rPr lang="en-US" altLang="en-US">
+                <a:ea typeface="Arial" panose="020B0604020202020204" pitchFamily="34" charset="0"/>
+              </a:rPr>
+              <a:t>Windows: </a:t>
+            </a:r>
+            <a:r>
+              <a:rPr lang="en-AU" altLang="en-US">
+                <a:ea typeface="Arial" panose="020B0604020202020204" pitchFamily="34" charset="0"/>
+                <a:hlinkClick r:id="rId2"/>
+              </a:rPr>
+              <a:t>https://gitforwindows.org/</a:t>
+            </a:r>
+            <a:br>
+              <a:rPr lang="en-AU" altLang="en-US">
+                <a:ea typeface="Arial" panose="020B0604020202020204" pitchFamily="34" charset="0"/>
+              </a:rPr>
+            </a:br>
+            <a:endParaRPr lang="en-US" altLang="en-US">
+              <a:ea typeface="Arial" panose="020B0604020202020204" pitchFamily="34" charset="0"/>
+            </a:endParaRPr>
+          </a:p>
+          <a:p>
+            <a:pPr marL="514350" indent="-514350">
+              <a:buFontTx/>
+              <a:buAutoNum type="arabicPeriod"/>
+            </a:pPr>
+            <a:r>
+              <a:rPr lang="en-US" altLang="en-US"/>
+              <a:t>Check Git is installed</a:t>
+            </a:r>
+          </a:p>
+          <a:p>
+            <a:pPr marL="514350" indent="-514350">
+              <a:buFontTx/>
+              <a:buAutoNum type="arabicPeriod"/>
+            </a:pPr>
+            <a:r>
+              <a:rPr lang="en-US" altLang="en-US"/>
+              <a:t>Set user.name and user.email</a:t>
+            </a:r>
+          </a:p>
+          <a:p>
+            <a:pPr marL="514350" indent="-514350">
+              <a:buFontTx/>
+              <a:buNone/>
+            </a:pPr>
+            <a:endParaRPr lang="en-US" altLang="en-US"/>
+          </a:p>
+          <a:p>
+            <a:pPr marL="514350" indent="-514350">
+              <a:buFontTx/>
+              <a:buNone/>
+            </a:pPr>
+            <a:endParaRPr lang="en-AU" altLang="en-US"/>
+          </a:p>
+          <a:p>
+            <a:pPr marL="914400" lvl="1" indent="-514350">
+              <a:buFontTx/>
+              <a:buNone/>
+            </a:pPr>
+            <a:endParaRPr lang="en-US" altLang="en-US">
+              <a:ea typeface="Arial" panose="020B0604020202020204" pitchFamily="34" charset="0"/>
+            </a:endParaRPr>
+          </a:p>
+          <a:p>
+            <a:pPr marL="514350" indent="-514350"/>
+            <a:endParaRPr lang="en-US" altLang="en-US"/>
+          </a:p>
+          <a:p>
+            <a:pPr marL="914400" lvl="1" indent="-514350"/>
+            <a:endParaRPr lang="en-US" altLang="en-US">
+              <a:ea typeface="Arial" panose="020B0604020202020204" pitchFamily="34" charset="0"/>
+            </a:endParaRPr>
+          </a:p>
+        </p:txBody>
+      </p:sp>
+    </p:spTree>
+  </p:cSld>
+  <p:clrMapOvr>
+    <a:masterClrMapping/>
+  </p:clrMapOvr>
+</p:sld>
+</file>
+
+<file path=ppt/slides/slide13.xml><?xml version="1.0" encoding="utf-8"?>
+<p:sld xmlns:a="http://schemas.openxmlformats.org/drawingml/2006/main" xmlns:r="http://schemas.openxmlformats.org/officeDocument/2006/relationships" xmlns:p="http://schemas.openxmlformats.org/presentationml/2006/main">
+  <p:cSld>
+    <p:spTree>
+      <p:nvGrpSpPr>
+        <p:cNvPr id="1" name=""/>
+        <p:cNvGrpSpPr/>
+        <p:nvPr/>
+      </p:nvGrpSpPr>
+      <p:grpSpPr>
+        <a:xfrm>
+          <a:off x="0" y="0"/>
+          <a:ext cx="0" cy="0"/>
+          <a:chOff x="0" y="0"/>
+          <a:chExt cx="0" cy="0"/>
+        </a:xfrm>
+      </p:grpSpPr>
+      <p:sp>
+        <p:nvSpPr>
+          <p:cNvPr id="21505" name="Title 1">
+            <a:extLst>
+              <a:ext uri="{FF2B5EF4-FFF2-40B4-BE49-F238E27FC236}">
+                <a16:creationId xmlns:a16="http://schemas.microsoft.com/office/drawing/2014/main" id="{0F3DF877-032C-C242-872D-29507D0CE823}"/>
+              </a:ext>
+            </a:extLst>
+          </p:cNvPr>
+          <p:cNvSpPr>
+            <a:spLocks noGrp="1" noChangeArrowheads="1"/>
+          </p:cNvSpPr>
+          <p:nvPr>
+            <p:ph type="title"/>
+          </p:nvPr>
+        </p:nvSpPr>
+        <p:spPr/>
+        <p:txBody>
+          <a:bodyPr/>
+          <a:lstStyle/>
+          <a:p>
+            <a:r>
+              <a:rPr lang="en-US" altLang="en-US"/>
+              <a:t>GitHub</a:t>
+            </a:r>
+          </a:p>
+        </p:txBody>
+      </p:sp>
+      <p:sp>
+        <p:nvSpPr>
+          <p:cNvPr id="21506" name="Content Placeholder 2">
+            <a:extLst>
+              <a:ext uri="{FF2B5EF4-FFF2-40B4-BE49-F238E27FC236}">
+                <a16:creationId xmlns:a16="http://schemas.microsoft.com/office/drawing/2014/main" id="{D1D510FA-5BED-A249-A506-7BDE5C6EE021}"/>
+              </a:ext>
+            </a:extLst>
+          </p:cNvPr>
+          <p:cNvSpPr>
+            <a:spLocks noGrp="1" noChangeArrowheads="1"/>
+          </p:cNvSpPr>
+          <p:nvPr>
+            <p:ph idx="1"/>
+          </p:nvPr>
+        </p:nvSpPr>
+        <p:spPr>
+          <a:xfrm>
+            <a:off x="457200" y="1570038"/>
+            <a:ext cx="8229600" cy="4525962"/>
+          </a:xfrm>
+        </p:spPr>
+        <p:txBody>
+          <a:bodyPr/>
+          <a:lstStyle/>
+          <a:p>
+            <a:pPr marL="0" indent="0">
+              <a:buFontTx/>
+              <a:buNone/>
+            </a:pPr>
+            <a:r>
+              <a:rPr lang="en-AU" altLang="en-US"/>
+              <a:t>GitHub (and other similar sites) allows you to host repositories remotely.</a:t>
+            </a:r>
+          </a:p>
+          <a:p>
+            <a:pPr marL="0" indent="0">
+              <a:buFontTx/>
+              <a:buNone/>
+            </a:pPr>
+            <a:br>
+              <a:rPr lang="en-AU" altLang="en-US"/>
+            </a:br>
+            <a:endParaRPr lang="en-AU" altLang="en-US"/>
+          </a:p>
+          <a:p>
+            <a:pPr marL="0" indent="0">
+              <a:buFontTx/>
+              <a:buNone/>
+            </a:pPr>
+            <a:r>
+              <a:rPr lang="en-US" altLang="en-US" sz="4000"/>
+              <a:t>Exercise: </a:t>
+            </a:r>
+          </a:p>
+          <a:p>
+            <a:pPr marL="0" indent="0"/>
+            <a:r>
+              <a:rPr lang="en-US" altLang="en-US"/>
+              <a:t>Sign up for a GitHub account. Use a university email if possible, and choose your username wisely!</a:t>
+            </a:r>
+          </a:p>
+          <a:p>
+            <a:pPr marL="0" indent="0">
+              <a:buFontTx/>
+              <a:buAutoNum type="arabicPeriod"/>
+            </a:pPr>
+            <a:endParaRPr lang="en-US" altLang="en-US"/>
+          </a:p>
+          <a:p>
+            <a:pPr marL="0" indent="0">
+              <a:buFontTx/>
+              <a:buNone/>
+            </a:pPr>
+            <a:endParaRPr lang="en-AU" altLang="en-US"/>
+          </a:p>
+          <a:p>
+            <a:pPr marL="457200" lvl="1" indent="0">
+              <a:buFontTx/>
+              <a:buNone/>
+            </a:pPr>
+            <a:endParaRPr lang="en-US" altLang="en-US">
+              <a:ea typeface="Arial" panose="020B0604020202020204" pitchFamily="34" charset="0"/>
+            </a:endParaRPr>
+          </a:p>
+          <a:p>
+            <a:pPr marL="0" indent="0"/>
+            <a:endParaRPr lang="en-US" altLang="en-US"/>
+          </a:p>
+          <a:p>
+            <a:pPr marL="457200" lvl="1" indent="0"/>
+            <a:endParaRPr lang="en-US" altLang="en-US">
+              <a:ea typeface="Arial" panose="020B0604020202020204" pitchFamily="34" charset="0"/>
+            </a:endParaRPr>
+          </a:p>
+        </p:txBody>
+      </p:sp>
+    </p:spTree>
+  </p:cSld>
+  <p:clrMapOvr>
+    <a:masterClrMapping/>
+  </p:clrMapOvr>
+</p:sld>
+</file>
+
+<file path=ppt/slides/slide14.xml><?xml version="1.0" encoding="utf-8"?>
 <p:sld xmlns:a="http://schemas.openxmlformats.org/drawingml/2006/main" xmlns:r="http://schemas.openxmlformats.org/officeDocument/2006/relationships" xmlns:p="http://schemas.openxmlformats.org/presentationml/2006/main">
   <p:cSld>
     <p:spTree>
@@ -5153,7 +5378,7 @@
 </p:sld>
 </file>
 
-<file path=ppt/slides/slide13.xml><?xml version="1.0" encoding="utf-8"?>
+<file path=ppt/slides/slide15.xml><?xml version="1.0" encoding="utf-8"?>
 <p:sld xmlns:a="http://schemas.openxmlformats.org/drawingml/2006/main" xmlns:r="http://schemas.openxmlformats.org/officeDocument/2006/relationships" xmlns:p="http://schemas.openxmlformats.org/presentationml/2006/main">
   <p:cSld>
     <p:spTree>
@@ -5732,7 +5957,7 @@
 </p:sld>
 </file>
 
-<file path=ppt/slides/slide14.xml><?xml version="1.0" encoding="utf-8"?>
+<file path=ppt/slides/slide16.xml><?xml version="1.0" encoding="utf-8"?>
 <p:sld xmlns:a="http://schemas.openxmlformats.org/drawingml/2006/main" xmlns:r="http://schemas.openxmlformats.org/officeDocument/2006/relationships" xmlns:p="http://schemas.openxmlformats.org/presentationml/2006/main">
   <p:cSld>
     <p:spTree>
@@ -5926,7 +6151,7 @@
 </p:sld>
 </file>
 
-<file path=ppt/slides/slide15.xml><?xml version="1.0" encoding="utf-8"?>
+<file path=ppt/slides/slide17.xml><?xml version="1.0" encoding="utf-8"?>
 <p:sld xmlns:a="http://schemas.openxmlformats.org/drawingml/2006/main" xmlns:r="http://schemas.openxmlformats.org/officeDocument/2006/relationships" xmlns:p="http://schemas.openxmlformats.org/presentationml/2006/main">
   <p:cSld>
     <p:spTree>
@@ -6192,7 +6417,7 @@
 </p:sld>
 </file>
 
-<file path=ppt/slides/slide16.xml><?xml version="1.0" encoding="utf-8"?>
+<file path=ppt/slides/slide18.xml><?xml version="1.0" encoding="utf-8"?>
 <p:sld xmlns:a="http://schemas.openxmlformats.org/drawingml/2006/main" xmlns:r="http://schemas.openxmlformats.org/officeDocument/2006/relationships" xmlns:p="http://schemas.openxmlformats.org/presentationml/2006/main">
   <p:cSld>
     <p:spTree>
@@ -6304,7 +6529,7 @@
 </p:sld>
 </file>
 
-<file path=ppt/slides/slide17.xml><?xml version="1.0" encoding="utf-8"?>
+<file path=ppt/slides/slide19.xml><?xml version="1.0" encoding="utf-8"?>
 <p:sld xmlns:a="http://schemas.openxmlformats.org/drawingml/2006/main" xmlns:r="http://schemas.openxmlformats.org/officeDocument/2006/relationships" xmlns:p="http://schemas.openxmlformats.org/presentationml/2006/main">
   <p:cSld>
     <p:spTree>
@@ -6622,7 +6847,154 @@
 </p:sld>
 </file>
 
-<file path=ppt/slides/slide18.xml><?xml version="1.0" encoding="utf-8"?>
+<file path=ppt/slides/slide2.xml><?xml version="1.0" encoding="utf-8"?>
+<p:sld xmlns:a="http://schemas.openxmlformats.org/drawingml/2006/main" xmlns:r="http://schemas.openxmlformats.org/officeDocument/2006/relationships" xmlns:p="http://schemas.openxmlformats.org/presentationml/2006/main">
+  <p:cSld>
+    <p:spTree>
+      <p:nvGrpSpPr>
+        <p:cNvPr id="1" name=""/>
+        <p:cNvGrpSpPr/>
+        <p:nvPr/>
+      </p:nvGrpSpPr>
+      <p:grpSpPr>
+        <a:xfrm>
+          <a:off x="0" y="0"/>
+          <a:ext cx="0" cy="0"/>
+          <a:chOff x="0" y="0"/>
+          <a:chExt cx="0" cy="0"/>
+        </a:xfrm>
+      </p:grpSpPr>
+      <p:sp>
+        <p:nvSpPr>
+          <p:cNvPr id="3" name="Content Placeholder 2">
+            <a:extLst>
+              <a:ext uri="{FF2B5EF4-FFF2-40B4-BE49-F238E27FC236}">
+                <a16:creationId xmlns:a16="http://schemas.microsoft.com/office/drawing/2014/main" id="{2A7A7CB2-85B4-AF42-905A-976C44FA5643}"/>
+              </a:ext>
+            </a:extLst>
+          </p:cNvPr>
+          <p:cNvSpPr>
+            <a:spLocks noGrp="1"/>
+          </p:cNvSpPr>
+          <p:nvPr>
+            <p:ph idx="1"/>
+          </p:nvPr>
+        </p:nvSpPr>
+        <p:spPr>
+          <a:xfrm>
+            <a:off x="762000" y="846138"/>
+            <a:ext cx="8763000" cy="4525963"/>
+          </a:xfrm>
+        </p:spPr>
+        <p:txBody>
+          <a:bodyPr/>
+          <a:lstStyle/>
+          <a:p>
+            <a:pPr marL="0" indent="0">
+              <a:buNone/>
+            </a:pPr>
+            <a:endParaRPr lang="en-AU" sz="4000" dirty="0"/>
+          </a:p>
+          <a:p>
+            <a:pPr marL="0" indent="0">
+              <a:buNone/>
+            </a:pPr>
+            <a:endParaRPr lang="en-AU" sz="4000" dirty="0"/>
+          </a:p>
+          <a:p>
+            <a:pPr marL="0" indent="0">
+              <a:buNone/>
+            </a:pPr>
+            <a:r>
+              <a:rPr lang="en-AU" sz="4000" dirty="0" err="1"/>
+              <a:t>Wifi</a:t>
+            </a:r>
+            <a:r>
+              <a:rPr lang="en-AU" sz="4000" dirty="0"/>
+              <a:t> name: Visitor wireless </a:t>
+            </a:r>
+            <a:br>
+              <a:rPr lang="en-AU" sz="4000" dirty="0"/>
+            </a:br>
+            <a:r>
+              <a:rPr lang="en-AU" sz="4000" dirty="0"/>
+              <a:t>			(or </a:t>
+            </a:r>
+            <a:r>
+              <a:rPr lang="en-AU" sz="4000" dirty="0" err="1"/>
+              <a:t>viswireless</a:t>
+            </a:r>
+            <a:r>
+              <a:rPr lang="en-AU" sz="4000" dirty="0"/>
+              <a:t>)</a:t>
+            </a:r>
+          </a:p>
+          <a:p>
+            <a:pPr marL="0" indent="0">
+              <a:buNone/>
+            </a:pPr>
+            <a:r>
+              <a:rPr lang="en-AU" sz="4000" dirty="0"/>
+              <a:t>Username: </a:t>
+            </a:r>
+            <a:r>
+              <a:rPr lang="en-AU" sz="4000" dirty="0" err="1"/>
+              <a:t>chd</a:t>
+            </a:r>
+            <a:r>
+              <a:rPr lang="en-AU" sz="4000" dirty="0"/>
+              <a:t>-school</a:t>
+            </a:r>
+            <a:br>
+              <a:rPr lang="en-AU" sz="4000" dirty="0"/>
+            </a:br>
+            <a:r>
+              <a:rPr lang="en-AU" sz="4000" dirty="0"/>
+              <a:t>Password: #dsG9y</a:t>
+            </a:r>
+            <a:endParaRPr lang="en-US" sz="4000" dirty="0"/>
+          </a:p>
+        </p:txBody>
+      </p:sp>
+      <p:sp>
+        <p:nvSpPr>
+          <p:cNvPr id="4" name="Title 3">
+            <a:extLst>
+              <a:ext uri="{FF2B5EF4-FFF2-40B4-BE49-F238E27FC236}">
+                <a16:creationId xmlns:a16="http://schemas.microsoft.com/office/drawing/2014/main" id="{B5624DC6-74B5-7046-86A1-67113C237BFF}"/>
+              </a:ext>
+            </a:extLst>
+          </p:cNvPr>
+          <p:cNvSpPr>
+            <a:spLocks noGrp="1"/>
+          </p:cNvSpPr>
+          <p:nvPr>
+            <p:ph type="title"/>
+          </p:nvPr>
+        </p:nvSpPr>
+        <p:spPr/>
+        <p:txBody>
+          <a:bodyPr/>
+          <a:lstStyle/>
+          <a:p>
+            <a:endParaRPr lang="en-US" dirty="0"/>
+          </a:p>
+        </p:txBody>
+      </p:sp>
+    </p:spTree>
+    <p:extLst>
+      <p:ext uri="{BB962C8B-B14F-4D97-AF65-F5344CB8AC3E}">
+        <p14:creationId xmlns:p14="http://schemas.microsoft.com/office/powerpoint/2010/main" val="2079804920"/>
+      </p:ext>
+    </p:extLst>
+  </p:cSld>
+  <p:clrMapOvr>
+    <a:masterClrMapping/>
+  </p:clrMapOvr>
+</p:sld>
+</file>
+
+<file path=ppt/slides/slide20.xml><?xml version="1.0" encoding="utf-8"?>
 <p:sld xmlns:a="http://schemas.openxmlformats.org/drawingml/2006/main" xmlns:r="http://schemas.openxmlformats.org/officeDocument/2006/relationships" xmlns:p="http://schemas.openxmlformats.org/presentationml/2006/main">
   <p:cSld>
     <p:spTree>
@@ -6979,153 +7351,6 @@
 </p:sld>
 </file>
 
-<file path=ppt/slides/slide2.xml><?xml version="1.0" encoding="utf-8"?>
-<p:sld xmlns:a="http://schemas.openxmlformats.org/drawingml/2006/main" xmlns:r="http://schemas.openxmlformats.org/officeDocument/2006/relationships" xmlns:p="http://schemas.openxmlformats.org/presentationml/2006/main">
-  <p:cSld>
-    <p:spTree>
-      <p:nvGrpSpPr>
-        <p:cNvPr id="1" name=""/>
-        <p:cNvGrpSpPr/>
-        <p:nvPr/>
-      </p:nvGrpSpPr>
-      <p:grpSpPr>
-        <a:xfrm>
-          <a:off x="0" y="0"/>
-          <a:ext cx="0" cy="0"/>
-          <a:chOff x="0" y="0"/>
-          <a:chExt cx="0" cy="0"/>
-        </a:xfrm>
-      </p:grpSpPr>
-      <p:sp>
-        <p:nvSpPr>
-          <p:cNvPr id="16385" name="Title 1">
-            <a:extLst>
-              <a:ext uri="{FF2B5EF4-FFF2-40B4-BE49-F238E27FC236}">
-                <a16:creationId xmlns:a16="http://schemas.microsoft.com/office/drawing/2014/main" id="{621D8D8D-2DA0-334A-A7CE-D0909293AAA2}"/>
-              </a:ext>
-            </a:extLst>
-          </p:cNvPr>
-          <p:cNvSpPr>
-            <a:spLocks noGrp="1" noChangeArrowheads="1"/>
-          </p:cNvSpPr>
-          <p:nvPr>
-            <p:ph type="title"/>
-          </p:nvPr>
-        </p:nvSpPr>
-        <p:spPr>
-          <a:xfrm>
-            <a:off x="457200" y="0"/>
-            <a:ext cx="8229600" cy="1143000"/>
-          </a:xfrm>
-        </p:spPr>
-        <p:txBody>
-          <a:bodyPr/>
-          <a:lstStyle/>
-          <a:p>
-            <a:r>
-              <a:rPr lang="en-US" altLang="en-US"/>
-              <a:t>Summer School Overview</a:t>
-            </a:r>
-          </a:p>
-        </p:txBody>
-      </p:sp>
-      <p:sp>
-        <p:nvSpPr>
-          <p:cNvPr id="2" name="Content Placeholder 1">
-            <a:extLst>
-              <a:ext uri="{FF2B5EF4-FFF2-40B4-BE49-F238E27FC236}">
-                <a16:creationId xmlns:a16="http://schemas.microsoft.com/office/drawing/2014/main" id="{BA01EF01-DEBC-1D41-8988-719B73F67FE2}"/>
-              </a:ext>
-            </a:extLst>
-          </p:cNvPr>
-          <p:cNvSpPr>
-            <a:spLocks noGrp="1"/>
-          </p:cNvSpPr>
-          <p:nvPr>
-            <p:ph idx="1"/>
-          </p:nvPr>
-        </p:nvSpPr>
-        <p:spPr>
-          <a:xfrm>
-            <a:off x="457200" y="1265238"/>
-            <a:ext cx="8229600" cy="4525962"/>
-          </a:xfrm>
-        </p:spPr>
-        <p:txBody>
-          <a:bodyPr/>
-          <a:lstStyle/>
-          <a:p>
-            <a:pPr marL="0" indent="0">
-              <a:buFontTx/>
-              <a:buNone/>
-              <a:defRPr/>
-            </a:pPr>
-            <a:endParaRPr lang="en-US" dirty="0"/>
-          </a:p>
-          <a:p>
-            <a:pPr>
-              <a:defRPr/>
-            </a:pPr>
-            <a:r>
-              <a:rPr lang="en-US" dirty="0"/>
-              <a:t>Day 0: R bootcamp</a:t>
-            </a:r>
-          </a:p>
-          <a:p>
-            <a:pPr>
-              <a:defRPr/>
-            </a:pPr>
-            <a:r>
-              <a:rPr lang="en-US" dirty="0"/>
-              <a:t>Day 1: Workflow, Google App Engine</a:t>
-            </a:r>
-          </a:p>
-          <a:p>
-            <a:pPr>
-              <a:defRPr/>
-            </a:pPr>
-            <a:r>
-              <a:rPr lang="en-US" dirty="0"/>
-              <a:t>Day 2: Online Experiments</a:t>
-            </a:r>
-          </a:p>
-          <a:p>
-            <a:pPr>
-              <a:defRPr/>
-            </a:pPr>
-            <a:r>
-              <a:rPr lang="en-US" dirty="0"/>
-              <a:t>Day 3: Data wrangling, visualization</a:t>
-            </a:r>
-          </a:p>
-          <a:p>
-            <a:pPr>
-              <a:defRPr/>
-            </a:pPr>
-            <a:r>
-              <a:rPr lang="en-US" dirty="0"/>
-              <a:t>Day 4: Statistics, Probabilistic models</a:t>
-            </a:r>
-          </a:p>
-          <a:p>
-            <a:pPr>
-              <a:defRPr/>
-            </a:pPr>
-            <a:r>
-              <a:rPr lang="en-US" dirty="0"/>
-              <a:t>Day 5: Experience sampling</a:t>
-            </a:r>
-          </a:p>
-        </p:txBody>
-      </p:sp>
-    </p:spTree>
-  </p:cSld>
-  <p:clrMapOvr>
-    <a:masterClrMapping/>
-  </p:clrMapOvr>
-</p:sld>
-</file>
-
 <file path=ppt/slides/slide3.xml><?xml version="1.0" encoding="utf-8"?>
 <p:sld xmlns:a="http://schemas.openxmlformats.org/drawingml/2006/main" xmlns:r="http://schemas.openxmlformats.org/officeDocument/2006/relationships" xmlns:p="http://schemas.openxmlformats.org/presentationml/2006/main">
   <p:cSld>
@@ -7145,15 +7370,15 @@
       </p:grpSpPr>
       <p:sp>
         <p:nvSpPr>
-          <p:cNvPr id="17409" name="Title 1">
-            <a:extLst>
-              <a:ext uri="{FF2B5EF4-FFF2-40B4-BE49-F238E27FC236}">
-                <a16:creationId xmlns:a16="http://schemas.microsoft.com/office/drawing/2014/main" id="{1CB6DEEB-52F6-DA44-94F3-153FC6BF962F}"/>
-              </a:ext>
-            </a:extLst>
-          </p:cNvPr>
-          <p:cNvSpPr>
-            <a:spLocks noGrp="1" noChangeArrowheads="1"/>
+          <p:cNvPr id="2" name="Title 1">
+            <a:extLst>
+              <a:ext uri="{FF2B5EF4-FFF2-40B4-BE49-F238E27FC236}">
+                <a16:creationId xmlns:a16="http://schemas.microsoft.com/office/drawing/2014/main" id="{9C768839-8826-E944-8A39-EA0590F1A6E0}"/>
+              </a:ext>
+            </a:extLst>
+          </p:cNvPr>
+          <p:cNvSpPr>
+            <a:spLocks noGrp="1"/>
           </p:cNvSpPr>
           <p:nvPr>
             <p:ph type="title"/>
@@ -7165,23 +7390,23 @@
           <a:lstStyle/>
           <a:p>
             <a:r>
-              <a:rPr lang="en-US" altLang="en-US"/>
-              <a:t>Announcements</a:t>
-            </a:r>
-          </a:p>
-        </p:txBody>
-      </p:sp>
-      <p:sp>
-        <p:nvSpPr>
-          <p:cNvPr id="17410" name="Content Placeholder 2">
-            <a:extLst>
-              <a:ext uri="{FF2B5EF4-FFF2-40B4-BE49-F238E27FC236}">
-                <a16:creationId xmlns:a16="http://schemas.microsoft.com/office/drawing/2014/main" id="{023A6D9B-C151-324A-AEE5-9C377F7D12AF}"/>
-              </a:ext>
-            </a:extLst>
-          </p:cNvPr>
-          <p:cNvSpPr>
-            <a:spLocks noGrp="1" noChangeArrowheads="1"/>
+              <a:rPr lang="en-US" dirty="0"/>
+              <a:t>Introductions</a:t>
+            </a:r>
+          </a:p>
+        </p:txBody>
+      </p:sp>
+      <p:sp>
+        <p:nvSpPr>
+          <p:cNvPr id="3" name="Content Placeholder 2">
+            <a:extLst>
+              <a:ext uri="{FF2B5EF4-FFF2-40B4-BE49-F238E27FC236}">
+                <a16:creationId xmlns:a16="http://schemas.microsoft.com/office/drawing/2014/main" id="{A119574F-95C2-DB43-809D-3C21F1AAE7BF}"/>
+              </a:ext>
+            </a:extLst>
+          </p:cNvPr>
+          <p:cNvSpPr>
+            <a:spLocks noGrp="1"/>
           </p:cNvSpPr>
           <p:nvPr>
             <p:ph idx="1"/>
@@ -7192,20 +7417,16 @@
           <a:bodyPr/>
           <a:lstStyle/>
           <a:p>
-            <a:r>
-              <a:rPr lang="en-US" altLang="en-US"/>
-              <a:t>Piazza</a:t>
-            </a:r>
-          </a:p>
-          <a:p>
-            <a:r>
-              <a:rPr lang="en-US" altLang="en-US"/>
-              <a:t>Photo and dinner tonight</a:t>
-            </a:r>
+            <a:endParaRPr lang="en-US"/>
           </a:p>
         </p:txBody>
       </p:sp>
     </p:spTree>
+    <p:extLst>
+      <p:ext uri="{BB962C8B-B14F-4D97-AF65-F5344CB8AC3E}">
+        <p14:creationId xmlns:p14="http://schemas.microsoft.com/office/powerpoint/2010/main" val="3430953788"/>
+      </p:ext>
+    </p:extLst>
   </p:cSld>
   <p:clrMapOvr>
     <a:masterClrMapping/>
@@ -7232,10 +7453,10 @@
       </p:grpSpPr>
       <p:sp>
         <p:nvSpPr>
-          <p:cNvPr id="18433" name="Title 1">
-            <a:extLst>
-              <a:ext uri="{FF2B5EF4-FFF2-40B4-BE49-F238E27FC236}">
-                <a16:creationId xmlns:a16="http://schemas.microsoft.com/office/drawing/2014/main" id="{DAB74C95-96DD-A04F-850B-93F0C43E38DD}"/>
+          <p:cNvPr id="16385" name="Title 1">
+            <a:extLst>
+              <a:ext uri="{FF2B5EF4-FFF2-40B4-BE49-F238E27FC236}">
+                <a16:creationId xmlns:a16="http://schemas.microsoft.com/office/drawing/2014/main" id="{621D8D8D-2DA0-334A-A7CE-D0909293AAA2}"/>
               </a:ext>
             </a:extLst>
           </p:cNvPr>
@@ -7248,8 +7469,8 @@
         </p:nvSpPr>
         <p:spPr>
           <a:xfrm>
-            <a:off x="-304800" y="274638"/>
-            <a:ext cx="9525000" cy="1143000"/>
+            <a:off x="457200" y="0"/>
+            <a:ext cx="8229600" cy="1143000"/>
           </a:xfrm>
         </p:spPr>
         <p:txBody>
@@ -7257,84 +7478,97 @@
           <a:lstStyle/>
           <a:p>
             <a:r>
-              <a:rPr lang="en-US" altLang="en-US" sz="4000"/>
-              <a:t>Day 1: Workflow, Google App Engine</a:t>
-            </a:r>
-          </a:p>
-        </p:txBody>
-      </p:sp>
-      <p:sp>
-        <p:nvSpPr>
-          <p:cNvPr id="18434" name="Content Placeholder 2">
-            <a:extLst>
-              <a:ext uri="{FF2B5EF4-FFF2-40B4-BE49-F238E27FC236}">
-                <a16:creationId xmlns:a16="http://schemas.microsoft.com/office/drawing/2014/main" id="{E5FC6785-83DA-014C-9A78-1A66A626FF54}"/>
-              </a:ext>
-            </a:extLst>
-          </p:cNvPr>
-          <p:cNvSpPr>
-            <a:spLocks noGrp="1" noChangeArrowheads="1"/>
+              <a:rPr lang="en-US" altLang="en-US"/>
+              <a:t>Summer School Overview</a:t>
+            </a:r>
+          </a:p>
+        </p:txBody>
+      </p:sp>
+      <p:sp>
+        <p:nvSpPr>
+          <p:cNvPr id="2" name="Content Placeholder 1">
+            <a:extLst>
+              <a:ext uri="{FF2B5EF4-FFF2-40B4-BE49-F238E27FC236}">
+                <a16:creationId xmlns:a16="http://schemas.microsoft.com/office/drawing/2014/main" id="{BA01EF01-DEBC-1D41-8988-719B73F67FE2}"/>
+              </a:ext>
+            </a:extLst>
+          </p:cNvPr>
+          <p:cNvSpPr>
+            <a:spLocks noGrp="1"/>
           </p:cNvSpPr>
           <p:nvPr>
             <p:ph idx="1"/>
           </p:nvPr>
         </p:nvSpPr>
-        <p:spPr/>
+        <p:spPr>
+          <a:xfrm>
+            <a:off x="457200" y="1265238"/>
+            <a:ext cx="8229600" cy="4525962"/>
+          </a:xfrm>
+        </p:spPr>
         <p:txBody>
           <a:bodyPr/>
           <a:lstStyle/>
           <a:p>
-            <a:pPr marL="514350" indent="-514350">
+            <a:pPr marL="0" indent="0">
               <a:buFontTx/>
-              <a:buAutoNum type="arabicPeriod"/>
+              <a:buNone/>
+              <a:defRPr/>
             </a:pPr>
-            <a:r>
-              <a:rPr lang="en-US" altLang="en-US"/>
-              <a:t>Git</a:t>
-            </a:r>
-          </a:p>
-          <a:p>
-            <a:pPr marL="514350" indent="-514350">
-              <a:buFontTx/>
-              <a:buAutoNum type="arabicPeriod"/>
+            <a:endParaRPr lang="en-US" dirty="0"/>
+          </a:p>
+          <a:p>
+            <a:pPr>
+              <a:defRPr/>
             </a:pPr>
             <a:r>
-              <a:rPr lang="en-US" altLang="en-US"/>
-              <a:t>Project organization</a:t>
-            </a:r>
-            <a:br>
-              <a:rPr lang="en-US" altLang="en-US"/>
-            </a:br>
-            <a:br>
-              <a:rPr lang="en-US" altLang="en-US"/>
-            </a:br>
-            <a:r>
-              <a:rPr lang="en-US" altLang="en-US"/>
-              <a:t>(lunch)</a:t>
-            </a:r>
-            <a:br>
-              <a:rPr lang="en-US" altLang="en-US"/>
-            </a:br>
-            <a:endParaRPr lang="en-US" altLang="en-US"/>
-          </a:p>
-          <a:p>
-            <a:pPr marL="514350" indent="-514350">
-              <a:buFontTx/>
-              <a:buAutoNum type="arabicPeriod"/>
+              <a:rPr lang="en-US" dirty="0"/>
+              <a:t>Day 0: R bootcamp</a:t>
+            </a:r>
+          </a:p>
+          <a:p>
+            <a:pPr>
+              <a:defRPr/>
             </a:pPr>
             <a:r>
-              <a:rPr lang="en-US" altLang="en-US"/>
-              <a:t>Hosting experiments online</a:t>
-            </a:r>
-          </a:p>
-          <a:p>
-            <a:pPr marL="514350" indent="-514350">
-              <a:buFontTx/>
-              <a:buAutoNum type="arabicPeriod"/>
+              <a:rPr lang="en-US" dirty="0"/>
+              <a:t>Day 1: Workflow, Google App Engine</a:t>
+            </a:r>
+          </a:p>
+          <a:p>
+            <a:pPr>
+              <a:defRPr/>
             </a:pPr>
             <a:r>
-              <a:rPr lang="en-US" altLang="en-US"/>
-              <a:t>Downloading data</a:t>
+              <a:rPr lang="en-US" dirty="0"/>
+              <a:t>Day 2: Online Experiments</a:t>
+            </a:r>
+          </a:p>
+          <a:p>
+            <a:pPr>
+              <a:defRPr/>
+            </a:pPr>
+            <a:r>
+              <a:rPr lang="en-US" dirty="0"/>
+              <a:t>Day 3: Data wrangling, visualization</a:t>
+            </a:r>
+          </a:p>
+          <a:p>
+            <a:pPr>
+              <a:defRPr/>
+            </a:pPr>
+            <a:r>
+              <a:rPr lang="en-US" dirty="0"/>
+              <a:t>Day 4: Statistics, Probabilistic models</a:t>
+            </a:r>
+          </a:p>
+          <a:p>
+            <a:pPr>
+              <a:defRPr/>
+            </a:pPr>
+            <a:r>
+              <a:rPr lang="en-US" dirty="0"/>
+              <a:t>Day 5: Experience sampling</a:t>
             </a:r>
           </a:p>
         </p:txBody>
@@ -7366,10 +7600,10 @@
       </p:grpSpPr>
       <p:sp>
         <p:nvSpPr>
-          <p:cNvPr id="26625" name="Title 1">
-            <a:extLst>
-              <a:ext uri="{FF2B5EF4-FFF2-40B4-BE49-F238E27FC236}">
-                <a16:creationId xmlns:a16="http://schemas.microsoft.com/office/drawing/2014/main" id="{606F08FC-FD06-7640-AAA6-3AF9D0A24F80}"/>
+          <p:cNvPr id="17409" name="Title 1">
+            <a:extLst>
+              <a:ext uri="{FF2B5EF4-FFF2-40B4-BE49-F238E27FC236}">
+                <a16:creationId xmlns:a16="http://schemas.microsoft.com/office/drawing/2014/main" id="{1CB6DEEB-52F6-DA44-94F3-153FC6BF962F}"/>
               </a:ext>
             </a:extLst>
           </p:cNvPr>
@@ -7387,17 +7621,17 @@
           <a:p>
             <a:r>
               <a:rPr lang="en-US" altLang="en-US"/>
-              <a:t>Why workflow matters</a:t>
-            </a:r>
-          </a:p>
-        </p:txBody>
-      </p:sp>
-      <p:sp>
-        <p:nvSpPr>
-          <p:cNvPr id="26626" name="Content Placeholder 2">
-            <a:extLst>
-              <a:ext uri="{FF2B5EF4-FFF2-40B4-BE49-F238E27FC236}">
-                <a16:creationId xmlns:a16="http://schemas.microsoft.com/office/drawing/2014/main" id="{8DF4A131-62CE-5E4C-B18B-33CC8A2D50C6}"/>
+              <a:t>Announcements</a:t>
+            </a:r>
+          </a:p>
+        </p:txBody>
+      </p:sp>
+      <p:sp>
+        <p:nvSpPr>
+          <p:cNvPr id="17410" name="Content Placeholder 2">
+            <a:extLst>
+              <a:ext uri="{FF2B5EF4-FFF2-40B4-BE49-F238E27FC236}">
+                <a16:creationId xmlns:a16="http://schemas.microsoft.com/office/drawing/2014/main" id="{023A6D9B-C151-324A-AEE5-9C377F7D12AF}"/>
               </a:ext>
             </a:extLst>
           </p:cNvPr>
@@ -7414,39 +7648,21 @@
           <a:lstStyle/>
           <a:p>
             <a:r>
-              <a:rPr lang="en-US" altLang="en-US"/>
-              <a:t>A good workflow</a:t>
-            </a:r>
-          </a:p>
-          <a:p>
-            <a:pPr lvl="1"/>
-            <a:r>
-              <a:rPr lang="en-US" altLang="en-US">
-                <a:ea typeface="Arial" panose="020B0604020202020204" pitchFamily="34" charset="0"/>
-              </a:rPr>
-              <a:t>saves time in the long run</a:t>
-            </a:r>
-          </a:p>
-          <a:p>
-            <a:pPr lvl="1"/>
-            <a:r>
-              <a:rPr lang="en-US" altLang="en-US">
-                <a:ea typeface="Arial" panose="020B0604020202020204" pitchFamily="34" charset="0"/>
-              </a:rPr>
-              <a:t>helps you avoid errors </a:t>
-            </a:r>
-          </a:p>
-          <a:p>
-            <a:pPr lvl="1"/>
-            <a:r>
-              <a:rPr lang="en-US" altLang="en-US">
-                <a:ea typeface="Arial" panose="020B0604020202020204" pitchFamily="34" charset="0"/>
-              </a:rPr>
-              <a:t>makes it easy for others to reproduce your work</a:t>
-            </a:r>
-          </a:p>
-          <a:p>
-            <a:endParaRPr lang="en-US" altLang="en-US"/>
+              <a:rPr lang="en-US" altLang="en-US" dirty="0"/>
+              <a:t>Piazza</a:t>
+            </a:r>
+          </a:p>
+          <a:p>
+            <a:r>
+              <a:rPr lang="en-US" altLang="en-US" dirty="0"/>
+              <a:t>Photo today: 4:40 at steps of Melbourne School of Design </a:t>
+            </a:r>
+          </a:p>
+          <a:p>
+            <a:r>
+              <a:rPr lang="en-US" altLang="en-US" dirty="0"/>
+              <a:t>Dinner tonight: 5:00 in the courtyard of the Redmond Barry building</a:t>
+            </a:r>
           </a:p>
         </p:txBody>
       </p:sp>
@@ -7459,6 +7675,251 @@
 </file>
 
 <file path=ppt/slides/slide6.xml><?xml version="1.0" encoding="utf-8"?>
+<p:sld xmlns:a="http://schemas.openxmlformats.org/drawingml/2006/main" xmlns:r="http://schemas.openxmlformats.org/officeDocument/2006/relationships" xmlns:p="http://schemas.openxmlformats.org/presentationml/2006/main">
+  <p:cSld>
+    <p:spTree>
+      <p:nvGrpSpPr>
+        <p:cNvPr id="1" name=""/>
+        <p:cNvGrpSpPr/>
+        <p:nvPr/>
+      </p:nvGrpSpPr>
+      <p:grpSpPr>
+        <a:xfrm>
+          <a:off x="0" y="0"/>
+          <a:ext cx="0" cy="0"/>
+          <a:chOff x="0" y="0"/>
+          <a:chExt cx="0" cy="0"/>
+        </a:xfrm>
+      </p:grpSpPr>
+      <p:sp>
+        <p:nvSpPr>
+          <p:cNvPr id="18433" name="Title 1">
+            <a:extLst>
+              <a:ext uri="{FF2B5EF4-FFF2-40B4-BE49-F238E27FC236}">
+                <a16:creationId xmlns:a16="http://schemas.microsoft.com/office/drawing/2014/main" id="{DAB74C95-96DD-A04F-850B-93F0C43E38DD}"/>
+              </a:ext>
+            </a:extLst>
+          </p:cNvPr>
+          <p:cNvSpPr>
+            <a:spLocks noGrp="1" noChangeArrowheads="1"/>
+          </p:cNvSpPr>
+          <p:nvPr>
+            <p:ph type="title"/>
+          </p:nvPr>
+        </p:nvSpPr>
+        <p:spPr>
+          <a:xfrm>
+            <a:off x="-304800" y="274638"/>
+            <a:ext cx="9525000" cy="1143000"/>
+          </a:xfrm>
+        </p:spPr>
+        <p:txBody>
+          <a:bodyPr/>
+          <a:lstStyle/>
+          <a:p>
+            <a:r>
+              <a:rPr lang="en-US" altLang="en-US" sz="4000"/>
+              <a:t>Day 1: Workflow, Google App Engine</a:t>
+            </a:r>
+          </a:p>
+        </p:txBody>
+      </p:sp>
+      <p:sp>
+        <p:nvSpPr>
+          <p:cNvPr id="18434" name="Content Placeholder 2">
+            <a:extLst>
+              <a:ext uri="{FF2B5EF4-FFF2-40B4-BE49-F238E27FC236}">
+                <a16:creationId xmlns:a16="http://schemas.microsoft.com/office/drawing/2014/main" id="{E5FC6785-83DA-014C-9A78-1A66A626FF54}"/>
+              </a:ext>
+            </a:extLst>
+          </p:cNvPr>
+          <p:cNvSpPr>
+            <a:spLocks noGrp="1" noChangeArrowheads="1"/>
+          </p:cNvSpPr>
+          <p:nvPr>
+            <p:ph idx="1"/>
+          </p:nvPr>
+        </p:nvSpPr>
+        <p:spPr/>
+        <p:txBody>
+          <a:bodyPr/>
+          <a:lstStyle/>
+          <a:p>
+            <a:pPr marL="514350" indent="-514350">
+              <a:buFontTx/>
+              <a:buAutoNum type="arabicPeriod"/>
+            </a:pPr>
+            <a:r>
+              <a:rPr lang="en-US" altLang="en-US" dirty="0"/>
+              <a:t>Git</a:t>
+            </a:r>
+          </a:p>
+          <a:p>
+            <a:pPr marL="514350" indent="-514350">
+              <a:buFontTx/>
+              <a:buAutoNum type="arabicPeriod"/>
+            </a:pPr>
+            <a:r>
+              <a:rPr lang="en-US" altLang="en-US" dirty="0"/>
+              <a:t>Project organization</a:t>
+            </a:r>
+            <a:br>
+              <a:rPr lang="en-US" altLang="en-US" dirty="0"/>
+            </a:br>
+            <a:br>
+              <a:rPr lang="en-US" altLang="en-US" dirty="0"/>
+            </a:br>
+            <a:r>
+              <a:rPr lang="en-US" altLang="en-US" dirty="0"/>
+              <a:t>(lunch)</a:t>
+            </a:r>
+            <a:br>
+              <a:rPr lang="en-US" altLang="en-US" dirty="0"/>
+            </a:br>
+            <a:endParaRPr lang="en-US" altLang="en-US" dirty="0"/>
+          </a:p>
+          <a:p>
+            <a:pPr marL="514350" indent="-514350">
+              <a:buFontTx/>
+              <a:buAutoNum type="arabicPeriod"/>
+            </a:pPr>
+            <a:r>
+              <a:rPr lang="en-US" altLang="en-US" dirty="0"/>
+              <a:t>Internet and webpages</a:t>
+            </a:r>
+          </a:p>
+          <a:p>
+            <a:pPr marL="514350" indent="-514350">
+              <a:buFontTx/>
+              <a:buAutoNum type="arabicPeriod"/>
+            </a:pPr>
+            <a:r>
+              <a:rPr lang="en-US" altLang="en-US" dirty="0"/>
+              <a:t>Deploying to Google App Engine</a:t>
+            </a:r>
+          </a:p>
+        </p:txBody>
+      </p:sp>
+    </p:spTree>
+  </p:cSld>
+  <p:clrMapOvr>
+    <a:masterClrMapping/>
+  </p:clrMapOvr>
+</p:sld>
+</file>
+
+<file path=ppt/slides/slide7.xml><?xml version="1.0" encoding="utf-8"?>
+<p:sld xmlns:a="http://schemas.openxmlformats.org/drawingml/2006/main" xmlns:r="http://schemas.openxmlformats.org/officeDocument/2006/relationships" xmlns:p="http://schemas.openxmlformats.org/presentationml/2006/main">
+  <p:cSld>
+    <p:spTree>
+      <p:nvGrpSpPr>
+        <p:cNvPr id="1" name=""/>
+        <p:cNvGrpSpPr/>
+        <p:nvPr/>
+      </p:nvGrpSpPr>
+      <p:grpSpPr>
+        <a:xfrm>
+          <a:off x="0" y="0"/>
+          <a:ext cx="0" cy="0"/>
+          <a:chOff x="0" y="0"/>
+          <a:chExt cx="0" cy="0"/>
+        </a:xfrm>
+      </p:grpSpPr>
+      <p:sp>
+        <p:nvSpPr>
+          <p:cNvPr id="26625" name="Title 1">
+            <a:extLst>
+              <a:ext uri="{FF2B5EF4-FFF2-40B4-BE49-F238E27FC236}">
+                <a16:creationId xmlns:a16="http://schemas.microsoft.com/office/drawing/2014/main" id="{606F08FC-FD06-7640-AAA6-3AF9D0A24F80}"/>
+              </a:ext>
+            </a:extLst>
+          </p:cNvPr>
+          <p:cNvSpPr>
+            <a:spLocks noGrp="1" noChangeArrowheads="1"/>
+          </p:cNvSpPr>
+          <p:nvPr>
+            <p:ph type="title"/>
+          </p:nvPr>
+        </p:nvSpPr>
+        <p:spPr/>
+        <p:txBody>
+          <a:bodyPr/>
+          <a:lstStyle/>
+          <a:p>
+            <a:r>
+              <a:rPr lang="en-US" altLang="en-US"/>
+              <a:t>Why workflow matters</a:t>
+            </a:r>
+          </a:p>
+        </p:txBody>
+      </p:sp>
+      <p:sp>
+        <p:nvSpPr>
+          <p:cNvPr id="26626" name="Content Placeholder 2">
+            <a:extLst>
+              <a:ext uri="{FF2B5EF4-FFF2-40B4-BE49-F238E27FC236}">
+                <a16:creationId xmlns:a16="http://schemas.microsoft.com/office/drawing/2014/main" id="{8DF4A131-62CE-5E4C-B18B-33CC8A2D50C6}"/>
+              </a:ext>
+            </a:extLst>
+          </p:cNvPr>
+          <p:cNvSpPr>
+            <a:spLocks noGrp="1" noChangeArrowheads="1"/>
+          </p:cNvSpPr>
+          <p:nvPr>
+            <p:ph idx="1"/>
+          </p:nvPr>
+        </p:nvSpPr>
+        <p:spPr/>
+        <p:txBody>
+          <a:bodyPr/>
+          <a:lstStyle/>
+          <a:p>
+            <a:r>
+              <a:rPr lang="en-US" altLang="en-US"/>
+              <a:t>A good workflow</a:t>
+            </a:r>
+          </a:p>
+          <a:p>
+            <a:pPr lvl="1"/>
+            <a:r>
+              <a:rPr lang="en-US" altLang="en-US">
+                <a:ea typeface="Arial" panose="020B0604020202020204" pitchFamily="34" charset="0"/>
+              </a:rPr>
+              <a:t>saves time in the long run</a:t>
+            </a:r>
+          </a:p>
+          <a:p>
+            <a:pPr lvl="1"/>
+            <a:r>
+              <a:rPr lang="en-US" altLang="en-US">
+                <a:ea typeface="Arial" panose="020B0604020202020204" pitchFamily="34" charset="0"/>
+              </a:rPr>
+              <a:t>helps you avoid errors </a:t>
+            </a:r>
+          </a:p>
+          <a:p>
+            <a:pPr lvl="1"/>
+            <a:r>
+              <a:rPr lang="en-US" altLang="en-US">
+                <a:ea typeface="Arial" panose="020B0604020202020204" pitchFamily="34" charset="0"/>
+              </a:rPr>
+              <a:t>makes it easy for others to reproduce your work</a:t>
+            </a:r>
+          </a:p>
+          <a:p>
+            <a:endParaRPr lang="en-US" altLang="en-US"/>
+          </a:p>
+        </p:txBody>
+      </p:sp>
+    </p:spTree>
+  </p:cSld>
+  <p:clrMapOvr>
+    <a:masterClrMapping/>
+  </p:clrMapOvr>
+</p:sld>
+</file>
+
+<file path=ppt/slides/slide8.xml><?xml version="1.0" encoding="utf-8"?>
 <p:sld xmlns:a="http://schemas.openxmlformats.org/drawingml/2006/main" xmlns:r="http://schemas.openxmlformats.org/officeDocument/2006/relationships" xmlns:p="http://schemas.openxmlformats.org/presentationml/2006/main">
   <p:cSld>
     <p:spTree>
@@ -7576,262 +8037,6 @@
 </p:sld>
 </file>
 
-<file path=ppt/slides/slide7.xml><?xml version="1.0" encoding="utf-8"?>
-<p:sld xmlns:a="http://schemas.openxmlformats.org/drawingml/2006/main" xmlns:r="http://schemas.openxmlformats.org/officeDocument/2006/relationships" xmlns:p="http://schemas.openxmlformats.org/presentationml/2006/main">
-  <p:cSld>
-    <p:spTree>
-      <p:nvGrpSpPr>
-        <p:cNvPr id="1" name=""/>
-        <p:cNvGrpSpPr/>
-        <p:nvPr/>
-      </p:nvGrpSpPr>
-      <p:grpSpPr>
-        <a:xfrm>
-          <a:off x="0" y="0"/>
-          <a:ext cx="0" cy="0"/>
-          <a:chOff x="0" y="0"/>
-          <a:chExt cx="0" cy="0"/>
-        </a:xfrm>
-      </p:grpSpPr>
-      <p:sp>
-        <p:nvSpPr>
-          <p:cNvPr id="28673" name="Title 1">
-            <a:extLst>
-              <a:ext uri="{FF2B5EF4-FFF2-40B4-BE49-F238E27FC236}">
-                <a16:creationId xmlns:a16="http://schemas.microsoft.com/office/drawing/2014/main" id="{6F7000A5-4AA1-8C4D-9CBE-0FEA5EEFDAFB}"/>
-              </a:ext>
-            </a:extLst>
-          </p:cNvPr>
-          <p:cNvSpPr>
-            <a:spLocks noGrp="1" noChangeArrowheads="1"/>
-          </p:cNvSpPr>
-          <p:nvPr>
-            <p:ph type="title"/>
-          </p:nvPr>
-        </p:nvSpPr>
-        <p:spPr>
-          <a:xfrm>
-            <a:off x="0" y="274638"/>
-            <a:ext cx="8686800" cy="1143000"/>
-          </a:xfrm>
-        </p:spPr>
-        <p:txBody>
-          <a:bodyPr/>
-          <a:lstStyle/>
-          <a:p>
-            <a:r>
-              <a:rPr lang="en-US" altLang="en-US"/>
-              <a:t>Reproducing computational work</a:t>
-            </a:r>
-          </a:p>
-        </p:txBody>
-      </p:sp>
-      <p:pic>
-        <p:nvPicPr>
-          <p:cNvPr id="28674" name="Picture 4">
-            <a:extLst>
-              <a:ext uri="{FF2B5EF4-FFF2-40B4-BE49-F238E27FC236}">
-                <a16:creationId xmlns:a16="http://schemas.microsoft.com/office/drawing/2014/main" id="{C5F3AF15-E797-F745-9229-4469FCE7ACA1}"/>
-              </a:ext>
-            </a:extLst>
-          </p:cNvPr>
-          <p:cNvPicPr>
-            <a:picLocks noChangeAspect="1" noChangeArrowheads="1"/>
-          </p:cNvPicPr>
-          <p:nvPr/>
-        </p:nvPicPr>
-        <p:blipFill>
-          <a:blip r:embed="rId2">
-            <a:extLst>
-              <a:ext uri="{28A0092B-C50C-407E-A947-70E740481C1C}">
-                <a14:useLocalDpi xmlns:a14="http://schemas.microsoft.com/office/drawing/2010/main" val="0"/>
-              </a:ext>
-            </a:extLst>
-          </a:blip>
-          <a:srcRect/>
-          <a:stretch>
-            <a:fillRect/>
-          </a:stretch>
-        </p:blipFill>
-        <p:spPr bwMode="auto">
-          <a:xfrm>
-            <a:off x="0" y="2514600"/>
-            <a:ext cx="9144000" cy="2392363"/>
-          </a:xfrm>
-          <a:prstGeom prst="rect">
-            <a:avLst/>
-          </a:prstGeom>
-          <a:noFill/>
-          <a:ln>
-            <a:noFill/>
-          </a:ln>
-          <a:extLst>
-            <a:ext uri="{909E8E84-426E-40DD-AFC4-6F175D3DCCD1}">
-              <a14:hiddenFill xmlns:a14="http://schemas.microsoft.com/office/drawing/2010/main">
-                <a:solidFill>
-                  <a:srgbClr val="FFFFFF"/>
-                </a:solidFill>
-              </a14:hiddenFill>
-            </a:ext>
-            <a:ext uri="{91240B29-F687-4F45-9708-019B960494DF}">
-              <a14:hiddenLine xmlns:a14="http://schemas.microsoft.com/office/drawing/2010/main" w="9525">
-                <a:solidFill>
-                  <a:srgbClr val="000000"/>
-                </a:solidFill>
-                <a:miter lim="800000"/>
-                <a:headEnd/>
-                <a:tailEnd/>
-              </a14:hiddenLine>
-            </a:ext>
-          </a:extLst>
-        </p:spPr>
-      </p:pic>
-    </p:spTree>
-  </p:cSld>
-  <p:clrMapOvr>
-    <a:masterClrMapping/>
-  </p:clrMapOvr>
-</p:sld>
-</file>
-
-<file path=ppt/slides/slide8.xml><?xml version="1.0" encoding="utf-8"?>
-<p:sld xmlns:a="http://schemas.openxmlformats.org/drawingml/2006/main" xmlns:r="http://schemas.openxmlformats.org/officeDocument/2006/relationships" xmlns:p="http://schemas.openxmlformats.org/presentationml/2006/main">
-  <p:cSld>
-    <p:spTree>
-      <p:nvGrpSpPr>
-        <p:cNvPr id="1" name=""/>
-        <p:cNvGrpSpPr/>
-        <p:nvPr/>
-      </p:nvGrpSpPr>
-      <p:grpSpPr>
-        <a:xfrm>
-          <a:off x="0" y="0"/>
-          <a:ext cx="0" cy="0"/>
-          <a:chOff x="0" y="0"/>
-          <a:chExt cx="0" cy="0"/>
-        </a:xfrm>
-      </p:grpSpPr>
-      <p:sp>
-        <p:nvSpPr>
-          <p:cNvPr id="19457" name="Title 1">
-            <a:extLst>
-              <a:ext uri="{FF2B5EF4-FFF2-40B4-BE49-F238E27FC236}">
-                <a16:creationId xmlns:a16="http://schemas.microsoft.com/office/drawing/2014/main" id="{A47132AC-57AB-434E-A0AA-5BF63B521B5A}"/>
-              </a:ext>
-            </a:extLst>
-          </p:cNvPr>
-          <p:cNvSpPr>
-            <a:spLocks noGrp="1" noChangeArrowheads="1"/>
-          </p:cNvSpPr>
-          <p:nvPr>
-            <p:ph type="title"/>
-          </p:nvPr>
-        </p:nvSpPr>
-        <p:spPr/>
-        <p:txBody>
-          <a:bodyPr/>
-          <a:lstStyle/>
-          <a:p>
-            <a:r>
-              <a:rPr lang="en-US" altLang="en-US"/>
-              <a:t>Version control with Git</a:t>
-            </a:r>
-          </a:p>
-        </p:txBody>
-      </p:sp>
-      <p:sp>
-        <p:nvSpPr>
-          <p:cNvPr id="19458" name="Content Placeholder 2">
-            <a:extLst>
-              <a:ext uri="{FF2B5EF4-FFF2-40B4-BE49-F238E27FC236}">
-                <a16:creationId xmlns:a16="http://schemas.microsoft.com/office/drawing/2014/main" id="{036B98B5-28F7-294A-B980-025B325F3014}"/>
-              </a:ext>
-            </a:extLst>
-          </p:cNvPr>
-          <p:cNvSpPr>
-            <a:spLocks noGrp="1" noChangeArrowheads="1"/>
-          </p:cNvSpPr>
-          <p:nvPr>
-            <p:ph idx="1"/>
-          </p:nvPr>
-        </p:nvSpPr>
-        <p:spPr/>
-        <p:txBody>
-          <a:bodyPr/>
-          <a:lstStyle/>
-          <a:p>
-            <a:r>
-              <a:rPr lang="en-US" altLang="en-US"/>
-              <a:t>Why use Git?</a:t>
-            </a:r>
-          </a:p>
-          <a:p>
-            <a:pPr lvl="1"/>
-            <a:r>
-              <a:rPr lang="en-US" altLang="en-US">
-                <a:ea typeface="Arial" panose="020B0604020202020204" pitchFamily="34" charset="0"/>
-              </a:rPr>
-              <a:t>keep a record of what you were doing and  thinking during the lifecycle of a project</a:t>
-            </a:r>
-          </a:p>
-          <a:p>
-            <a:pPr lvl="1"/>
-            <a:r>
-              <a:rPr lang="en-US" altLang="en-US">
-                <a:ea typeface="Arial" panose="020B0604020202020204" pitchFamily="34" charset="0"/>
-              </a:rPr>
-              <a:t>“version control is like an undo command for </a:t>
-            </a:r>
-            <a:r>
-              <a:rPr lang="en-US" altLang="en-US" i="1">
-                <a:ea typeface="Arial" panose="020B0604020202020204" pitchFamily="34" charset="0"/>
-              </a:rPr>
-              <a:t>everything</a:t>
-            </a:r>
-            <a:r>
-              <a:rPr lang="en-US" altLang="en-US">
-                <a:ea typeface="Arial" panose="020B0604020202020204" pitchFamily="34" charset="0"/>
-              </a:rPr>
-              <a:t>” </a:t>
-            </a:r>
-          </a:p>
-          <a:p>
-            <a:pPr lvl="1"/>
-            <a:r>
-              <a:rPr lang="en-US" altLang="en-US">
-                <a:ea typeface="Arial" panose="020B0604020202020204" pitchFamily="34" charset="0"/>
-              </a:rPr>
-              <a:t>have a backup if your laptop dies or is stolen </a:t>
-            </a:r>
-          </a:p>
-          <a:p>
-            <a:pPr lvl="1"/>
-            <a:r>
-              <a:rPr lang="en-US" altLang="en-US">
-                <a:ea typeface="Arial" panose="020B0604020202020204" pitchFamily="34" charset="0"/>
-              </a:rPr>
-              <a:t>collaborate on code and writing (optional)</a:t>
-            </a:r>
-          </a:p>
-          <a:p>
-            <a:pPr lvl="1"/>
-            <a:r>
-              <a:rPr lang="en-US" altLang="en-US">
-                <a:ea typeface="Arial" panose="020B0604020202020204" pitchFamily="34" charset="0"/>
-              </a:rPr>
-              <a:t>release code and data publicly (optional)</a:t>
-            </a:r>
-          </a:p>
-        </p:txBody>
-      </p:sp>
-    </p:spTree>
-  </p:cSld>
-  <p:clrMapOvr>
-    <a:masterClrMapping/>
-  </p:clrMapOvr>
-</p:sld>
-</file>
-
 <file path=ppt/slides/slide9.xml><?xml version="1.0" encoding="utf-8"?>
 <p:sld xmlns:a="http://schemas.openxmlformats.org/drawingml/2006/main" xmlns:r="http://schemas.openxmlformats.org/officeDocument/2006/relationships" xmlns:p="http://schemas.openxmlformats.org/presentationml/2006/main">
   <p:cSld>
@@ -7849,12 +8054,45 @@
           <a:chExt cx="0" cy="0"/>
         </a:xfrm>
       </p:grpSpPr>
+      <p:sp>
+        <p:nvSpPr>
+          <p:cNvPr id="28673" name="Title 1">
+            <a:extLst>
+              <a:ext uri="{FF2B5EF4-FFF2-40B4-BE49-F238E27FC236}">
+                <a16:creationId xmlns:a16="http://schemas.microsoft.com/office/drawing/2014/main" id="{6F7000A5-4AA1-8C4D-9CBE-0FEA5EEFDAFB}"/>
+              </a:ext>
+            </a:extLst>
+          </p:cNvPr>
+          <p:cNvSpPr>
+            <a:spLocks noGrp="1" noChangeArrowheads="1"/>
+          </p:cNvSpPr>
+          <p:nvPr>
+            <p:ph type="title"/>
+          </p:nvPr>
+        </p:nvSpPr>
+        <p:spPr>
+          <a:xfrm>
+            <a:off x="0" y="274638"/>
+            <a:ext cx="8686800" cy="1143000"/>
+          </a:xfrm>
+        </p:spPr>
+        <p:txBody>
+          <a:bodyPr/>
+          <a:lstStyle/>
+          <a:p>
+            <a:r>
+              <a:rPr lang="en-US" altLang="en-US"/>
+              <a:t>Reproducing computational work</a:t>
+            </a:r>
+          </a:p>
+        </p:txBody>
+      </p:sp>
       <p:pic>
         <p:nvPicPr>
-          <p:cNvPr id="29697" name="Picture 3">
-            <a:extLst>
-              <a:ext uri="{FF2B5EF4-FFF2-40B4-BE49-F238E27FC236}">
-                <a16:creationId xmlns:a16="http://schemas.microsoft.com/office/drawing/2014/main" id="{F1DEDE6A-376F-1F44-A78E-46FD9CBC099E}"/>
+          <p:cNvPr id="28674" name="Picture 4">
+            <a:extLst>
+              <a:ext uri="{FF2B5EF4-FFF2-40B4-BE49-F238E27FC236}">
+                <a16:creationId xmlns:a16="http://schemas.microsoft.com/office/drawing/2014/main" id="{C5F3AF15-E797-F745-9229-4469FCE7ACA1}"/>
               </a:ext>
             </a:extLst>
           </p:cNvPr>
@@ -7878,8 +8116,8 @@
         </p:blipFill>
         <p:spPr bwMode="auto">
           <a:xfrm>
-            <a:off x="2686050" y="698500"/>
-            <a:ext cx="3771900" cy="5461000"/>
+            <a:off x="0" y="2514600"/>
+            <a:ext cx="9144000" cy="2392363"/>
           </a:xfrm>
           <a:prstGeom prst="rect">
             <a:avLst/>

</xml_diff>

<commit_message>
edits to stats tutorial
</commit_message>
<xml_diff>
--- a/day1/slides/git.pptx
+++ b/day1/slides/git.pptx
@@ -4536,7 +4536,7 @@
           <a:p>
             <a:pPr eaLnBrk="1" hangingPunct="1"/>
             <a:r>
-              <a:rPr lang="en-US" altLang="en-US"/>
+              <a:rPr lang="en-US" altLang="en-US" dirty="0"/>
               <a:t>Welcome to Day 1!</a:t>
             </a:r>
           </a:p>
@@ -4564,8 +4564,17 @@
           <a:lstStyle/>
           <a:p>
             <a:r>
-              <a:rPr lang="en-US" altLang="en-US"/>
+              <a:rPr lang="en-US" altLang="en-US" dirty="0"/>
               <a:t>Complex Human Data Summer School</a:t>
+            </a:r>
+          </a:p>
+          <a:p>
+            <a:endParaRPr lang="en-US" altLang="en-US" dirty="0"/>
+          </a:p>
+          <a:p>
+            <a:r>
+              <a:rPr lang="en-US" altLang="en-US" dirty="0"/>
+              <a:t>#chdss19</a:t>
             </a:r>
           </a:p>
         </p:txBody>
@@ -6893,7 +6902,10 @@
             <a:pPr marL="0" indent="0">
               <a:buNone/>
             </a:pPr>
-            <a:endParaRPr lang="en-AU" sz="4000" dirty="0"/>
+            <a:r>
+              <a:rPr lang="en-AU" sz="4000" dirty="0"/>
+              <a:t>Post-its: take one yellow and one non-yellow</a:t>
+            </a:r>
           </a:p>
           <a:p>
             <a:pPr marL="0" indent="0">
@@ -6905,17 +6917,23 @@
             <a:pPr marL="0" indent="0">
               <a:buNone/>
             </a:pPr>
-            <a:r>
-              <a:rPr lang="en-AU" sz="4000" dirty="0" err="1"/>
-              <a:t>Wifi</a:t>
-            </a:r>
-            <a:r>
-              <a:rPr lang="en-AU" sz="4000" dirty="0"/>
-              <a:t> name: Visitor wireless </a:t>
-            </a:r>
             <a:br>
               <a:rPr lang="en-AU" sz="4000" dirty="0"/>
             </a:br>
+            <a:br>
+              <a:rPr lang="en-AU" sz="4000" dirty="0"/>
+            </a:br>
+            <a:r>
+              <a:rPr lang="en-AU" sz="4000" dirty="0" err="1"/>
+              <a:t>Wifi</a:t>
+            </a:r>
+            <a:r>
+              <a:rPr lang="en-AU" sz="4000" dirty="0"/>
+              <a:t> name: Visitor wireless </a:t>
+            </a:r>
+            <a:br>
+              <a:rPr lang="en-AU" sz="4000" dirty="0"/>
+            </a:br>
             <a:r>
               <a:rPr lang="en-AU" sz="4000" dirty="0"/>
               <a:t>			(or </a:t>
@@ -6953,31 +6971,6 @@
               <a:t>Password: #dsG9y</a:t>
             </a:r>
             <a:endParaRPr lang="en-US" sz="4000" dirty="0"/>
-          </a:p>
-        </p:txBody>
-      </p:sp>
-      <p:sp>
-        <p:nvSpPr>
-          <p:cNvPr id="4" name="Title 3">
-            <a:extLst>
-              <a:ext uri="{FF2B5EF4-FFF2-40B4-BE49-F238E27FC236}">
-                <a16:creationId xmlns:a16="http://schemas.microsoft.com/office/drawing/2014/main" id="{B5624DC6-74B5-7046-86A1-67113C237BFF}"/>
-              </a:ext>
-            </a:extLst>
-          </p:cNvPr>
-          <p:cNvSpPr>
-            <a:spLocks noGrp="1"/>
-          </p:cNvSpPr>
-          <p:nvPr>
-            <p:ph type="title"/>
-          </p:nvPr>
-        </p:nvSpPr>
-        <p:spPr/>
-        <p:txBody>
-          <a:bodyPr/>
-          <a:lstStyle/>
-          <a:p>
-            <a:endParaRPr lang="en-US" dirty="0"/>
           </a:p>
         </p:txBody>
       </p:sp>
@@ -8401,7 +8394,7 @@
         <a:effectLst/>
         <a:extLst>
           <a:ext uri="{AF507438-7753-43e0-B8FC-AC1667EBCBE1}">
-            <a14:hiddenEffects xmlns:a14="http://schemas.microsoft.com/office/drawing/2010/main" xmlns="">
+            <a14:hiddenEffects xmlns="" xmlns:a14="http://schemas.microsoft.com/office/drawing/2010/main">
               <a:effectLst>
                 <a:outerShdw blurRad="63500" dist="38099" dir="2700000" algn="ctr" rotWithShape="0">
                   <a:schemeClr val="bg2">
@@ -8478,7 +8471,7 @@
         <a:effectLst/>
         <a:extLst>
           <a:ext uri="{AF507438-7753-43e0-B8FC-AC1667EBCBE1}">
-            <a14:hiddenEffects xmlns:a14="http://schemas.microsoft.com/office/drawing/2010/main" xmlns="">
+            <a14:hiddenEffects xmlns="" xmlns:a14="http://schemas.microsoft.com/office/drawing/2010/main">
               <a:effectLst>
                 <a:outerShdw blurRad="63500" dist="38099" dir="2700000" algn="ctr" rotWithShape="0">
                   <a:schemeClr val="bg2">

</xml_diff>